<commit_message>
add pd analyze, sort and filter
</commit_message>
<xml_diff>
--- a/Powerpoint/2 Data Science.pptx
+++ b/Powerpoint/2 Data Science.pptx
@@ -5,10 +5,10 @@
     <p:sldMasterId id="2147483658" r:id="rId1"/>
   </p:sldMasterIdLst>
   <p:notesMasterIdLst>
-    <p:notesMasterId r:id="rId26"/>
+    <p:notesMasterId r:id="rId28"/>
   </p:notesMasterIdLst>
   <p:handoutMasterIdLst>
-    <p:handoutMasterId r:id="rId27"/>
+    <p:handoutMasterId r:id="rId29"/>
   </p:handoutMasterIdLst>
   <p:sldIdLst>
     <p:sldId id="256" r:id="rId2"/>
@@ -22,8 +22,8 @@
     <p:sldId id="342" r:id="rId10"/>
     <p:sldId id="343" r:id="rId11"/>
     <p:sldId id="344" r:id="rId12"/>
-    <p:sldId id="345" r:id="rId13"/>
-    <p:sldId id="346" r:id="rId14"/>
+    <p:sldId id="346" r:id="rId13"/>
+    <p:sldId id="345" r:id="rId14"/>
     <p:sldId id="347" r:id="rId15"/>
     <p:sldId id="348" r:id="rId16"/>
     <p:sldId id="334" r:id="rId17"/>
@@ -31,39 +31,41 @@
     <p:sldId id="351" r:id="rId19"/>
     <p:sldId id="352" r:id="rId20"/>
     <p:sldId id="353" r:id="rId21"/>
-    <p:sldId id="354" r:id="rId22"/>
-    <p:sldId id="335" r:id="rId23"/>
-    <p:sldId id="340" r:id="rId24"/>
-    <p:sldId id="280" r:id="rId25"/>
+    <p:sldId id="355" r:id="rId22"/>
+    <p:sldId id="356" r:id="rId23"/>
+    <p:sldId id="354" r:id="rId24"/>
+    <p:sldId id="335" r:id="rId25"/>
+    <p:sldId id="340" r:id="rId26"/>
+    <p:sldId id="280" r:id="rId27"/>
   </p:sldIdLst>
   <p:sldSz cx="9144000" cy="5143500" type="screen16x9"/>
   <p:notesSz cx="6858000" cy="9144000"/>
   <p:embeddedFontLst>
     <p:embeddedFont>
       <p:font typeface="Consolas" panose="020B0609020204030204" pitchFamily="49" charset="0"/>
-      <p:regular r:id="rId28"/>
-      <p:bold r:id="rId29"/>
-      <p:italic r:id="rId30"/>
-      <p:boldItalic r:id="rId31"/>
+      <p:regular r:id="rId30"/>
+      <p:bold r:id="rId31"/>
+      <p:italic r:id="rId32"/>
+      <p:boldItalic r:id="rId33"/>
     </p:embeddedFont>
     <p:embeddedFont>
       <p:font typeface="Roboto Slab" panose="020B0604020202020204" charset="0"/>
-      <p:regular r:id="rId32"/>
-      <p:bold r:id="rId33"/>
+      <p:regular r:id="rId34"/>
+      <p:bold r:id="rId35"/>
     </p:embeddedFont>
     <p:embeddedFont>
       <p:font typeface="Source Sans Pro" panose="020B0503030403020204" pitchFamily="34" charset="0"/>
-      <p:regular r:id="rId34"/>
-      <p:bold r:id="rId35"/>
-      <p:italic r:id="rId36"/>
-      <p:boldItalic r:id="rId37"/>
+      <p:regular r:id="rId36"/>
+      <p:bold r:id="rId37"/>
+      <p:italic r:id="rId38"/>
+      <p:boldItalic r:id="rId39"/>
     </p:embeddedFont>
     <p:embeddedFont>
       <p:font typeface="Trebuchet MS" panose="020B0603020202020204" pitchFamily="34" charset="0"/>
-      <p:regular r:id="rId38"/>
-      <p:bold r:id="rId39"/>
-      <p:italic r:id="rId40"/>
-      <p:boldItalic r:id="rId41"/>
+      <p:regular r:id="rId40"/>
+      <p:bold r:id="rId41"/>
+      <p:italic r:id="rId42"/>
+      <p:boldItalic r:id="rId43"/>
     </p:embeddedFont>
   </p:embeddedFontLst>
   <p:defaultTextStyle>
@@ -6753,7 +6755,7 @@
           <a:p>
             <a:fld id="{7CEEE0ED-A0F5-4442-9C94-5288E26FF1D3}" type="datetimeFigureOut">
               <a:rPr lang="fa-IR" smtClean="0"/>
-              <a:t>19/09/1444</a:t>
+              <a:t>21/09/1444</a:t>
             </a:fld>
             <a:endParaRPr lang="fa-IR"/>
           </a:p>
@@ -7398,6 +7400,115 @@
   <p:cSld>
     <p:spTree>
       <p:nvGrpSpPr>
+        <p:cNvPr id="1" name="Shape 93"/>
+        <p:cNvGrpSpPr/>
+        <p:nvPr/>
+      </p:nvGrpSpPr>
+      <p:grpSpPr>
+        <a:xfrm>
+          <a:off x="0" y="0"/>
+          <a:ext cx="0" cy="0"/>
+          <a:chOff x="0" y="0"/>
+          <a:chExt cx="0" cy="0"/>
+        </a:xfrm>
+      </p:grpSpPr>
+      <p:sp>
+        <p:nvSpPr>
+          <p:cNvPr id="94" name="Google Shape;94;g35f391192_029:notes"/>
+          <p:cNvSpPr>
+            <a:spLocks noGrp="1" noRot="1" noChangeAspect="1"/>
+          </p:cNvSpPr>
+          <p:nvPr>
+            <p:ph type="sldImg" idx="2"/>
+          </p:nvPr>
+        </p:nvSpPr>
+        <p:spPr>
+          <a:xfrm>
+            <a:off x="381000" y="685800"/>
+            <a:ext cx="6096000" cy="3429000"/>
+          </a:xfrm>
+          <a:custGeom>
+            <a:avLst/>
+            <a:gdLst/>
+            <a:ahLst/>
+            <a:cxnLst/>
+            <a:rect l="l" t="t" r="r" b="b"/>
+            <a:pathLst>
+              <a:path w="120000" h="120000" extrusionOk="0">
+                <a:moveTo>
+                  <a:pt x="0" y="0"/>
+                </a:moveTo>
+                <a:lnTo>
+                  <a:pt x="120000" y="0"/>
+                </a:lnTo>
+                <a:lnTo>
+                  <a:pt x="120000" y="120000"/>
+                </a:lnTo>
+                <a:lnTo>
+                  <a:pt x="0" y="120000"/>
+                </a:lnTo>
+                <a:close/>
+              </a:path>
+            </a:pathLst>
+          </a:custGeom>
+        </p:spPr>
+      </p:sp>
+      <p:sp>
+        <p:nvSpPr>
+          <p:cNvPr id="95" name="Google Shape;95;g35f391192_029:notes"/>
+          <p:cNvSpPr txBox="1">
+            <a:spLocks noGrp="1"/>
+          </p:cNvSpPr>
+          <p:nvPr>
+            <p:ph type="body" idx="1"/>
+          </p:nvPr>
+        </p:nvSpPr>
+        <p:spPr>
+          <a:xfrm>
+            <a:off x="685800" y="4343400"/>
+            <a:ext cx="5486400" cy="4114800"/>
+          </a:xfrm>
+          <a:prstGeom prst="rect">
+            <a:avLst/>
+          </a:prstGeom>
+        </p:spPr>
+        <p:txBody>
+          <a:bodyPr spcFirstLastPara="1" wrap="square" lIns="91425" tIns="91425" rIns="91425" bIns="91425" anchor="t" anchorCtr="0">
+            <a:noAutofit/>
+          </a:bodyPr>
+          <a:lstStyle/>
+          <a:p>
+            <a:pPr marL="0" lvl="0" indent="0" algn="l" rtl="0">
+              <a:spcBef>
+                <a:spcPts val="0"/>
+              </a:spcBef>
+              <a:spcAft>
+                <a:spcPts val="0"/>
+              </a:spcAft>
+              <a:buNone/>
+            </a:pPr>
+            <a:endParaRPr/>
+          </a:p>
+        </p:txBody>
+      </p:sp>
+    </p:spTree>
+    <p:extLst>
+      <p:ext uri="{BB962C8B-B14F-4D97-AF65-F5344CB8AC3E}">
+        <p14:creationId xmlns:p14="http://schemas.microsoft.com/office/powerpoint/2010/main" val="1150731996"/>
+      </p:ext>
+    </p:extLst>
+  </p:cSld>
+  <p:clrMapOvr>
+    <a:masterClrMapping/>
+  </p:clrMapOvr>
+</p:notes>
+</file>
+
+<file path=ppt/notesSlides/notesSlide11.xml><?xml version="1.0" encoding="utf-8"?>
+<p:notes xmlns:a="http://schemas.openxmlformats.org/drawingml/2006/main" xmlns:r="http://schemas.openxmlformats.org/officeDocument/2006/relationships" xmlns:p="http://schemas.openxmlformats.org/presentationml/2006/main" showMasterSp="0" showMasterPhAnim="0">
+  <p:cSld>
+    <p:spTree>
+      <p:nvGrpSpPr>
         <p:cNvPr id="1" name="Shape 399"/>
         <p:cNvGrpSpPr/>
         <p:nvPr/>
@@ -8012,7 +8123,7 @@
     </p:spTree>
     <p:extLst>
       <p:ext uri="{BB962C8B-B14F-4D97-AF65-F5344CB8AC3E}">
-        <p14:creationId xmlns:p14="http://schemas.microsoft.com/office/powerpoint/2010/main" val="641327374"/>
+        <p14:creationId xmlns:p14="http://schemas.microsoft.com/office/powerpoint/2010/main" val="4162882744"/>
       </p:ext>
     </p:extLst>
   </p:cSld>
@@ -8023,11 +8134,11 @@
 </file>
 
 <file path=ppt/notesSlides/notesSlide8.xml><?xml version="1.0" encoding="utf-8"?>
-<p:notes xmlns:a="http://schemas.openxmlformats.org/drawingml/2006/main" xmlns:r="http://schemas.openxmlformats.org/officeDocument/2006/relationships" xmlns:p="http://schemas.openxmlformats.org/presentationml/2006/main" showMasterSp="0" showMasterPhAnim="0">
+<p:notes xmlns:a="http://schemas.openxmlformats.org/drawingml/2006/main" xmlns:r="http://schemas.openxmlformats.org/officeDocument/2006/relationships" xmlns:p="http://schemas.openxmlformats.org/presentationml/2006/main">
   <p:cSld>
     <p:spTree>
       <p:nvGrpSpPr>
-        <p:cNvPr id="1" name="Shape 93"/>
+        <p:cNvPr id="1" name=""/>
         <p:cNvGrpSpPr/>
         <p:nvPr/>
       </p:nvGrpSpPr>
@@ -8041,12 +8152,12 @@
       </p:grpSpPr>
       <p:sp>
         <p:nvSpPr>
-          <p:cNvPr id="94" name="Google Shape;94;g35f391192_029:notes"/>
+          <p:cNvPr id="2" name="Slide Image Placeholder 1"/>
           <p:cNvSpPr>
             <a:spLocks noGrp="1" noRot="1" noChangeAspect="1"/>
           </p:cNvSpPr>
           <p:nvPr>
-            <p:ph type="sldImg" idx="2"/>
+            <p:ph type="sldImg"/>
           </p:nvPr>
         </p:nvSpPr>
         <p:spPr>
@@ -8054,74 +8165,31 @@
             <a:off x="381000" y="685800"/>
             <a:ext cx="6096000" cy="3429000"/>
           </a:xfrm>
-          <a:custGeom>
-            <a:avLst/>
-            <a:gdLst/>
-            <a:ahLst/>
-            <a:cxnLst/>
-            <a:rect l="l" t="t" r="r" b="b"/>
-            <a:pathLst>
-              <a:path w="120000" h="120000" extrusionOk="0">
-                <a:moveTo>
-                  <a:pt x="0" y="0"/>
-                </a:moveTo>
-                <a:lnTo>
-                  <a:pt x="120000" y="0"/>
-                </a:lnTo>
-                <a:lnTo>
-                  <a:pt x="120000" y="120000"/>
-                </a:lnTo>
-                <a:lnTo>
-                  <a:pt x="0" y="120000"/>
-                </a:lnTo>
-                <a:close/>
-              </a:path>
-            </a:pathLst>
-          </a:custGeom>
         </p:spPr>
       </p:sp>
       <p:sp>
         <p:nvSpPr>
-          <p:cNvPr id="95" name="Google Shape;95;g35f391192_029:notes"/>
-          <p:cNvSpPr txBox="1">
+          <p:cNvPr id="3" name="Notes Placeholder 2"/>
+          <p:cNvSpPr>
             <a:spLocks noGrp="1"/>
           </p:cNvSpPr>
           <p:nvPr>
             <p:ph type="body" idx="1"/>
           </p:nvPr>
         </p:nvSpPr>
-        <p:spPr>
-          <a:xfrm>
-            <a:off x="685800" y="4343400"/>
-            <a:ext cx="5486400" cy="4114800"/>
-          </a:xfrm>
-          <a:prstGeom prst="rect">
-            <a:avLst/>
-          </a:prstGeom>
-        </p:spPr>
+        <p:spPr/>
         <p:txBody>
-          <a:bodyPr spcFirstLastPara="1" wrap="square" lIns="91425" tIns="91425" rIns="91425" bIns="91425" anchor="t" anchorCtr="0">
-            <a:noAutofit/>
-          </a:bodyPr>
+          <a:bodyPr/>
           <a:lstStyle/>
           <a:p>
-            <a:pPr marL="0" lvl="0" indent="0" algn="l" rtl="0">
-              <a:spcBef>
-                <a:spcPts val="0"/>
-              </a:spcBef>
-              <a:spcAft>
-                <a:spcPts val="0"/>
-              </a:spcAft>
-              <a:buNone/>
-            </a:pPr>
-            <a:endParaRPr/>
+            <a:endParaRPr lang="en-US"/>
           </a:p>
         </p:txBody>
       </p:sp>
     </p:spTree>
     <p:extLst>
       <p:ext uri="{BB962C8B-B14F-4D97-AF65-F5344CB8AC3E}">
-        <p14:creationId xmlns:p14="http://schemas.microsoft.com/office/powerpoint/2010/main" val="3390362646"/>
+        <p14:creationId xmlns:p14="http://schemas.microsoft.com/office/powerpoint/2010/main" val="641327374"/>
       </p:ext>
     </p:extLst>
   </p:cSld>
@@ -8230,7 +8298,7 @@
     </p:spTree>
     <p:extLst>
       <p:ext uri="{BB962C8B-B14F-4D97-AF65-F5344CB8AC3E}">
-        <p14:creationId xmlns:p14="http://schemas.microsoft.com/office/powerpoint/2010/main" val="1150731996"/>
+        <p14:creationId xmlns:p14="http://schemas.microsoft.com/office/powerpoint/2010/main" val="3390362646"/>
       </p:ext>
     </p:extLst>
   </p:cSld>
@@ -12186,7 +12254,7 @@
           <a:p>
             <a:r>
               <a:rPr lang="en-US" sz="2400"/>
-              <a:t>Search and Filter</a:t>
+              <a:t>Sort</a:t>
             </a:r>
             <a:endParaRPr lang="fa-IR"/>
           </a:p>
@@ -12223,7 +12291,7 @@
             </a:pPr>
             <a:r>
               <a:rPr lang="en-US" sz="1400"/>
-              <a:t>Searching arrays</a:t>
+              <a:t>Sorting arrays</a:t>
             </a:r>
           </a:p>
           <a:p>
@@ -12254,13 +12322,13 @@
                 </a:solidFill>
                 <a:latin typeface="Consolas" panose="020B0609020204030204" pitchFamily="49" charset="0"/>
               </a:rPr>
-              <a:t>where(</a:t>
-            </a:r>
-            <a:r>
-              <a:rPr lang="en-US" sz="1100">
-                <a:latin typeface="Consolas" panose="020B0609020204030204" pitchFamily="49" charset="0"/>
-              </a:rPr>
-              <a:t>arr == 4</a:t>
+              <a:t>sort(</a:t>
+            </a:r>
+            <a:r>
+              <a:rPr lang="en-US" sz="1100">
+                <a:latin typeface="Consolas" panose="020B0609020204030204" pitchFamily="49" charset="0"/>
+              </a:rPr>
+              <a:t>arr</a:t>
             </a:r>
             <a:r>
               <a:rPr lang="en-US" sz="1100">
@@ -12282,17 +12350,6 @@
             <a:pPr marL="76200" indent="0">
               <a:buNone/>
             </a:pPr>
-            <a:r>
-              <a:rPr lang="en-US" sz="1100">
-                <a:latin typeface="Consolas" panose="020B0609020204030204" pitchFamily="49" charset="0"/>
-              </a:rPr>
-              <a:t>print(np.where(arr % 2 == 0))</a:t>
-            </a:r>
-          </a:p>
-          <a:p>
-            <a:pPr marL="76200" indent="0">
-              <a:buNone/>
-            </a:pPr>
             <a:endParaRPr lang="en-US" sz="1100">
               <a:latin typeface="Consolas" panose="020B0609020204030204" pitchFamily="49" charset="0"/>
             </a:endParaRPr>
@@ -12303,7 +12360,7 @@
             </a:pPr>
             <a:r>
               <a:rPr lang="en-US" sz="1400"/>
-              <a:t>Filtering arrays</a:t>
+              <a:t>Search Sorted</a:t>
             </a:r>
           </a:p>
           <a:p>
@@ -12325,7 +12382,7 @@
               <a:rPr lang="en-US" sz="1100">
                 <a:latin typeface="Consolas" panose="020B0609020204030204" pitchFamily="49" charset="0"/>
               </a:rPr>
-              <a:t>print(arr</a:t>
+              <a:t>print(np.</a:t>
             </a:r>
             <a:r>
               <a:rPr lang="en-US" sz="1100">
@@ -12334,13 +12391,13 @@
                 </a:solidFill>
                 <a:latin typeface="Consolas" panose="020B0609020204030204" pitchFamily="49" charset="0"/>
               </a:rPr>
-              <a:t>[</a:t>
-            </a:r>
-            <a:r>
-              <a:rPr lang="en-US" sz="1100">
-                <a:latin typeface="Consolas" panose="020B0609020204030204" pitchFamily="49" charset="0"/>
-              </a:rPr>
-              <a:t>arr % 2 == 0</a:t>
+              <a:t>searchsorted(</a:t>
+            </a:r>
+            <a:r>
+              <a:rPr lang="en-US" sz="1100">
+                <a:latin typeface="Consolas" panose="020B0609020204030204" pitchFamily="49" charset="0"/>
+              </a:rPr>
+              <a:t>arr, 3</a:t>
             </a:r>
             <a:r>
               <a:rPr lang="en-US" sz="1100">
@@ -12349,13 +12406,24 @@
                 </a:solidFill>
                 <a:latin typeface="Consolas" panose="020B0609020204030204" pitchFamily="49" charset="0"/>
               </a:rPr>
-              <a:t>]</a:t>
-            </a:r>
-            <a:r>
-              <a:rPr lang="en-US" sz="1100">
-                <a:latin typeface="Consolas" panose="020B0609020204030204" pitchFamily="49" charset="0"/>
-              </a:rPr>
               <a:t>)</a:t>
+            </a:r>
+            <a:r>
+              <a:rPr lang="en-US" sz="1100">
+                <a:latin typeface="Consolas" panose="020B0609020204030204" pitchFamily="49" charset="0"/>
+              </a:rPr>
+              <a:t>)</a:t>
+            </a:r>
+          </a:p>
+          <a:p>
+            <a:pPr marL="76200" indent="0">
+              <a:buNone/>
+            </a:pPr>
+            <a:r>
+              <a:rPr lang="en-US" sz="1100">
+                <a:latin typeface="Consolas" panose="020B0609020204030204" pitchFamily="49" charset="0"/>
+              </a:rPr>
+              <a:t>print(np.searchsorted(arr, 5))</a:t>
             </a:r>
           </a:p>
         </p:txBody>
@@ -12401,7 +12469,7 @@
     </p:spTree>
     <p:extLst>
       <p:ext uri="{BB962C8B-B14F-4D97-AF65-F5344CB8AC3E}">
-        <p14:creationId xmlns:p14="http://schemas.microsoft.com/office/powerpoint/2010/main" val="1557836894"/>
+        <p14:creationId xmlns:p14="http://schemas.microsoft.com/office/powerpoint/2010/main" val="133725986"/>
       </p:ext>
     </p:extLst>
   </p:cSld>
@@ -12451,7 +12519,7 @@
           <a:p>
             <a:r>
               <a:rPr lang="en-US" sz="2400"/>
-              <a:t>Sort</a:t>
+              <a:t>Search and Filter</a:t>
             </a:r>
             <a:endParaRPr lang="fa-IR"/>
           </a:p>
@@ -12488,7 +12556,7 @@
             </a:pPr>
             <a:r>
               <a:rPr lang="en-US" sz="1400"/>
-              <a:t>Sorting arrays</a:t>
+              <a:t>Searching arrays</a:t>
             </a:r>
           </a:p>
           <a:p>
@@ -12519,13 +12587,13 @@
                 </a:solidFill>
                 <a:latin typeface="Consolas" panose="020B0609020204030204" pitchFamily="49" charset="0"/>
               </a:rPr>
-              <a:t>sort(</a:t>
-            </a:r>
-            <a:r>
-              <a:rPr lang="en-US" sz="1100">
-                <a:latin typeface="Consolas" panose="020B0609020204030204" pitchFamily="49" charset="0"/>
-              </a:rPr>
-              <a:t>arr</a:t>
+              <a:t>where(</a:t>
+            </a:r>
+            <a:r>
+              <a:rPr lang="en-US" sz="1100">
+                <a:latin typeface="Consolas" panose="020B0609020204030204" pitchFamily="49" charset="0"/>
+              </a:rPr>
+              <a:t>arr == 4</a:t>
             </a:r>
             <a:r>
               <a:rPr lang="en-US" sz="1100">
@@ -12547,6 +12615,17 @@
             <a:pPr marL="76200" indent="0">
               <a:buNone/>
             </a:pPr>
+            <a:r>
+              <a:rPr lang="en-US" sz="1100">
+                <a:latin typeface="Consolas" panose="020B0609020204030204" pitchFamily="49" charset="0"/>
+              </a:rPr>
+              <a:t>print(np.where(arr % 2 == 0))</a:t>
+            </a:r>
+          </a:p>
+          <a:p>
+            <a:pPr marL="76200" indent="0">
+              <a:buNone/>
+            </a:pPr>
             <a:endParaRPr lang="en-US" sz="1100">
               <a:latin typeface="Consolas" panose="020B0609020204030204" pitchFamily="49" charset="0"/>
             </a:endParaRPr>
@@ -12557,7 +12636,7 @@
             </a:pPr>
             <a:r>
               <a:rPr lang="en-US" sz="1400"/>
-              <a:t>Search Sorted</a:t>
+              <a:t>Filtering arrays</a:t>
             </a:r>
           </a:p>
           <a:p>
@@ -12579,7 +12658,7 @@
               <a:rPr lang="en-US" sz="1100">
                 <a:latin typeface="Consolas" panose="020B0609020204030204" pitchFamily="49" charset="0"/>
               </a:rPr>
-              <a:t>print(np.</a:t>
+              <a:t>print(arr</a:t>
             </a:r>
             <a:r>
               <a:rPr lang="en-US" sz="1100">
@@ -12588,13 +12667,13 @@
                 </a:solidFill>
                 <a:latin typeface="Consolas" panose="020B0609020204030204" pitchFamily="49" charset="0"/>
               </a:rPr>
-              <a:t>searchsorted(</a:t>
-            </a:r>
-            <a:r>
-              <a:rPr lang="en-US" sz="1100">
-                <a:latin typeface="Consolas" panose="020B0609020204030204" pitchFamily="49" charset="0"/>
-              </a:rPr>
-              <a:t>arr, 3</a:t>
+              <a:t>[</a:t>
+            </a:r>
+            <a:r>
+              <a:rPr lang="en-US" sz="1100">
+                <a:latin typeface="Consolas" panose="020B0609020204030204" pitchFamily="49" charset="0"/>
+              </a:rPr>
+              <a:t>arr % 2 == 0</a:t>
             </a:r>
             <a:r>
               <a:rPr lang="en-US" sz="1100">
@@ -12603,24 +12682,13 @@
                 </a:solidFill>
                 <a:latin typeface="Consolas" panose="020B0609020204030204" pitchFamily="49" charset="0"/>
               </a:rPr>
+              <a:t>]</a:t>
+            </a:r>
+            <a:r>
+              <a:rPr lang="en-US" sz="1100">
+                <a:latin typeface="Consolas" panose="020B0609020204030204" pitchFamily="49" charset="0"/>
+              </a:rPr>
               <a:t>)</a:t>
-            </a:r>
-            <a:r>
-              <a:rPr lang="en-US" sz="1100">
-                <a:latin typeface="Consolas" panose="020B0609020204030204" pitchFamily="49" charset="0"/>
-              </a:rPr>
-              <a:t>)</a:t>
-            </a:r>
-          </a:p>
-          <a:p>
-            <a:pPr marL="76200" indent="0">
-              <a:buNone/>
-            </a:pPr>
-            <a:r>
-              <a:rPr lang="en-US" sz="1100">
-                <a:latin typeface="Consolas" panose="020B0609020204030204" pitchFamily="49" charset="0"/>
-              </a:rPr>
-              <a:t>print(np.searchsorted(arr, 5))</a:t>
             </a:r>
           </a:p>
         </p:txBody>
@@ -12666,7 +12734,7 @@
     </p:spTree>
     <p:extLst>
       <p:ext uri="{BB962C8B-B14F-4D97-AF65-F5344CB8AC3E}">
-        <p14:creationId xmlns:p14="http://schemas.microsoft.com/office/powerpoint/2010/main" val="133725986"/>
+        <p14:creationId xmlns:p14="http://schemas.microsoft.com/office/powerpoint/2010/main" val="1557836894"/>
       </p:ext>
     </p:extLst>
   </p:cSld>
@@ -14275,7 +14343,7 @@
               <a:rPr lang="en-US" sz="1100">
                 <a:latin typeface="Consolas" panose="020B0609020204030204" pitchFamily="49" charset="0"/>
               </a:rPr>
-              <a:t> 1</a:t>
+              <a:t> 2</a:t>
             </a:r>
             <a:r>
               <a:rPr lang="en-US" sz="1100">
@@ -14621,7 +14689,7 @@
             </a:pPr>
             <a:r>
               <a:rPr lang="en-US"/>
-              <a:t>Read and view</a:t>
+              <a:t>Read files</a:t>
             </a:r>
           </a:p>
           <a:p>
@@ -14727,101 +14795,6 @@
             </a:r>
           </a:p>
           <a:p>
-            <a:pPr marL="76200" indent="0" algn="just">
-              <a:buNone/>
-            </a:pPr>
-            <a:r>
-              <a:rPr lang="en-US" sz="1100">
-                <a:latin typeface="Consolas" panose="020B0609020204030204" pitchFamily="49" charset="0"/>
-              </a:rPr>
-              <a:t>print(df</a:t>
-            </a:r>
-            <a:r>
-              <a:rPr lang="en-US" sz="1100">
-                <a:solidFill>
-                  <a:schemeClr val="accent1"/>
-                </a:solidFill>
-                <a:latin typeface="Consolas" panose="020B0609020204030204" pitchFamily="49" charset="0"/>
-              </a:rPr>
-              <a:t>.head()</a:t>
-            </a:r>
-            <a:r>
-              <a:rPr lang="en-US" sz="1100">
-                <a:latin typeface="Consolas" panose="020B0609020204030204" pitchFamily="49" charset="0"/>
-              </a:rPr>
-              <a:t>)</a:t>
-            </a:r>
-          </a:p>
-          <a:p>
-            <a:r>
-              <a:rPr lang="en-US" sz="1100">
-                <a:latin typeface="Consolas" panose="020B0609020204030204" pitchFamily="49" charset="0"/>
-              </a:rPr>
-              <a:t>print(df</a:t>
-            </a:r>
-            <a:r>
-              <a:rPr lang="en-US" sz="1100">
-                <a:solidFill>
-                  <a:schemeClr val="accent1"/>
-                </a:solidFill>
-                <a:latin typeface="Consolas" panose="020B0609020204030204" pitchFamily="49" charset="0"/>
-              </a:rPr>
-              <a:t>.tail()</a:t>
-            </a:r>
-            <a:r>
-              <a:rPr lang="en-US" sz="1100">
-                <a:latin typeface="Consolas" panose="020B0609020204030204" pitchFamily="49" charset="0"/>
-              </a:rPr>
-              <a:t>)</a:t>
-            </a:r>
-          </a:p>
-          <a:p>
-            <a:r>
-              <a:rPr lang="en-US" sz="1100">
-                <a:latin typeface="Consolas" panose="020B0609020204030204" pitchFamily="49" charset="0"/>
-              </a:rPr>
-              <a:t>print(df</a:t>
-            </a:r>
-            <a:r>
-              <a:rPr lang="en-US" sz="1100">
-                <a:solidFill>
-                  <a:schemeClr val="accent1"/>
-                </a:solidFill>
-                <a:latin typeface="Consolas" panose="020B0609020204030204" pitchFamily="49" charset="0"/>
-              </a:rPr>
-              <a:t>.info()</a:t>
-            </a:r>
-            <a:r>
-              <a:rPr lang="en-US" sz="1100">
-                <a:latin typeface="Consolas" panose="020B0609020204030204" pitchFamily="49" charset="0"/>
-              </a:rPr>
-              <a:t>)</a:t>
-            </a:r>
-          </a:p>
-          <a:p>
-            <a:r>
-              <a:rPr lang="en-US" sz="1100">
-                <a:latin typeface="Consolas" panose="020B0609020204030204" pitchFamily="49" charset="0"/>
-              </a:rPr>
-              <a:t>print(df</a:t>
-            </a:r>
-            <a:r>
-              <a:rPr lang="en-US" sz="1100">
-                <a:solidFill>
-                  <a:schemeClr val="accent1"/>
-                </a:solidFill>
-                <a:latin typeface="Consolas" panose="020B0609020204030204" pitchFamily="49" charset="0"/>
-              </a:rPr>
-              <a:t>.describe()</a:t>
-            </a:r>
-            <a:r>
-              <a:rPr lang="en-US" sz="1100">
-                <a:latin typeface="Consolas" panose="020B0609020204030204" pitchFamily="49" charset="0"/>
-              </a:rPr>
-              <a:t>)</a:t>
-            </a:r>
-          </a:p>
-          <a:p>
             <a:endParaRPr lang="en-US" sz="1100">
               <a:latin typeface="Consolas" panose="020B0609020204030204" pitchFamily="49" charset="0"/>
             </a:endParaRPr>
@@ -14829,7 +14802,7 @@
           <a:p>
             <a:r>
               <a:rPr lang="en-US"/>
-              <a:t>Write to file</a:t>
+              <a:t>Write files</a:t>
             </a:r>
             <a:endParaRPr lang="en-US">
               <a:latin typeface="Consolas" panose="020B0609020204030204" pitchFamily="49" charset="0"/>
@@ -15035,6 +15008,563 @@
           <a:p>
             <a:r>
               <a:rPr lang="en-US"/>
+              <a:t>Analyze</a:t>
+            </a:r>
+            <a:endParaRPr lang="fa-IR"/>
+          </a:p>
+        </p:txBody>
+      </p:sp>
+      <p:sp>
+        <p:nvSpPr>
+          <p:cNvPr id="3" name="Text Placeholder 2">
+            <a:extLst>
+              <a:ext uri="{FF2B5EF4-FFF2-40B4-BE49-F238E27FC236}">
+                <a16:creationId xmlns:a16="http://schemas.microsoft.com/office/drawing/2014/main" id="{58BE3078-8B89-4550-B497-93E4DADBD57E}"/>
+              </a:ext>
+            </a:extLst>
+          </p:cNvPr>
+          <p:cNvSpPr>
+            <a:spLocks noGrp="1"/>
+          </p:cNvSpPr>
+          <p:nvPr>
+            <p:ph type="body" idx="1"/>
+          </p:nvPr>
+        </p:nvSpPr>
+        <p:spPr>
+          <a:xfrm>
+            <a:off x="786150" y="1142608"/>
+            <a:ext cx="7571700" cy="3626431"/>
+          </a:xfrm>
+        </p:spPr>
+        <p:txBody>
+          <a:bodyPr/>
+          <a:lstStyle/>
+          <a:p>
+            <a:pPr marL="76200" indent="0" algn="just">
+              <a:buNone/>
+            </a:pPr>
+            <a:r>
+              <a:rPr lang="en-US"/>
+              <a:t>View</a:t>
+            </a:r>
+          </a:p>
+          <a:p>
+            <a:r>
+              <a:rPr lang="en-US" sz="1100">
+                <a:latin typeface="Consolas" panose="020B0609020204030204" pitchFamily="49" charset="0"/>
+              </a:rPr>
+              <a:t>df = pd.DataFrame({'calories': [420, 380, 390], 'duration': [50, 40, 45]})</a:t>
+            </a:r>
+          </a:p>
+          <a:p>
+            <a:pPr marL="76200" indent="0" algn="just">
+              <a:buNone/>
+            </a:pPr>
+            <a:r>
+              <a:rPr lang="en-US" sz="1100">
+                <a:latin typeface="Consolas" panose="020B0609020204030204" pitchFamily="49" charset="0"/>
+              </a:rPr>
+              <a:t>print(df</a:t>
+            </a:r>
+            <a:r>
+              <a:rPr lang="en-US" sz="1100">
+                <a:solidFill>
+                  <a:schemeClr val="accent1"/>
+                </a:solidFill>
+                <a:latin typeface="Consolas" panose="020B0609020204030204" pitchFamily="49" charset="0"/>
+              </a:rPr>
+              <a:t>.head()</a:t>
+            </a:r>
+            <a:r>
+              <a:rPr lang="en-US" sz="1100">
+                <a:latin typeface="Consolas" panose="020B0609020204030204" pitchFamily="49" charset="0"/>
+              </a:rPr>
+              <a:t>)</a:t>
+            </a:r>
+          </a:p>
+          <a:p>
+            <a:r>
+              <a:rPr lang="en-US" sz="1100">
+                <a:latin typeface="Consolas" panose="020B0609020204030204" pitchFamily="49" charset="0"/>
+              </a:rPr>
+              <a:t>print(df</a:t>
+            </a:r>
+            <a:r>
+              <a:rPr lang="en-US" sz="1100">
+                <a:solidFill>
+                  <a:schemeClr val="accent1"/>
+                </a:solidFill>
+                <a:latin typeface="Consolas" panose="020B0609020204030204" pitchFamily="49" charset="0"/>
+              </a:rPr>
+              <a:t>.tail()</a:t>
+            </a:r>
+            <a:r>
+              <a:rPr lang="en-US" sz="1100">
+                <a:latin typeface="Consolas" panose="020B0609020204030204" pitchFamily="49" charset="0"/>
+              </a:rPr>
+              <a:t>)</a:t>
+            </a:r>
+          </a:p>
+          <a:p>
+            <a:r>
+              <a:rPr lang="en-US" sz="1100">
+                <a:latin typeface="Consolas" panose="020B0609020204030204" pitchFamily="49" charset="0"/>
+              </a:rPr>
+              <a:t>print(df</a:t>
+            </a:r>
+            <a:r>
+              <a:rPr lang="en-US" sz="1100">
+                <a:solidFill>
+                  <a:schemeClr val="accent1"/>
+                </a:solidFill>
+                <a:latin typeface="Consolas" panose="020B0609020204030204" pitchFamily="49" charset="0"/>
+              </a:rPr>
+              <a:t>.index</a:t>
+            </a:r>
+            <a:r>
+              <a:rPr lang="en-US" sz="1100">
+                <a:latin typeface="Consolas" panose="020B0609020204030204" pitchFamily="49" charset="0"/>
+              </a:rPr>
+              <a:t>)</a:t>
+            </a:r>
+          </a:p>
+          <a:p>
+            <a:r>
+              <a:rPr lang="en-US" sz="1100">
+                <a:latin typeface="Consolas" panose="020B0609020204030204" pitchFamily="49" charset="0"/>
+              </a:rPr>
+              <a:t>print(df</a:t>
+            </a:r>
+            <a:r>
+              <a:rPr lang="en-US" sz="1100">
+                <a:solidFill>
+                  <a:schemeClr val="accent1"/>
+                </a:solidFill>
+                <a:latin typeface="Consolas" panose="020B0609020204030204" pitchFamily="49" charset="0"/>
+              </a:rPr>
+              <a:t>.columns</a:t>
+            </a:r>
+            <a:r>
+              <a:rPr lang="en-US" sz="1100">
+                <a:latin typeface="Consolas" panose="020B0609020204030204" pitchFamily="49" charset="0"/>
+              </a:rPr>
+              <a:t>)</a:t>
+            </a:r>
+          </a:p>
+          <a:p>
+            <a:endParaRPr lang="en-US" sz="1100">
+              <a:latin typeface="Consolas" panose="020B0609020204030204" pitchFamily="49" charset="0"/>
+            </a:endParaRPr>
+          </a:p>
+          <a:p>
+            <a:r>
+              <a:rPr lang="en-US"/>
+              <a:t>Information</a:t>
+            </a:r>
+            <a:endParaRPr lang="en-US" sz="1100">
+              <a:latin typeface="Consolas" panose="020B0609020204030204" pitchFamily="49" charset="0"/>
+            </a:endParaRPr>
+          </a:p>
+          <a:p>
+            <a:r>
+              <a:rPr lang="en-US" sz="1100">
+                <a:latin typeface="Consolas" panose="020B0609020204030204" pitchFamily="49" charset="0"/>
+              </a:rPr>
+              <a:t>print(df</a:t>
+            </a:r>
+            <a:r>
+              <a:rPr lang="en-US" sz="1100">
+                <a:solidFill>
+                  <a:schemeClr val="accent1"/>
+                </a:solidFill>
+                <a:latin typeface="Consolas" panose="020B0609020204030204" pitchFamily="49" charset="0"/>
+              </a:rPr>
+              <a:t>.info()</a:t>
+            </a:r>
+            <a:r>
+              <a:rPr lang="en-US" sz="1100">
+                <a:latin typeface="Consolas" panose="020B0609020204030204" pitchFamily="49" charset="0"/>
+              </a:rPr>
+              <a:t>)</a:t>
+            </a:r>
+          </a:p>
+          <a:p>
+            <a:r>
+              <a:rPr lang="en-US" sz="1100">
+                <a:latin typeface="Consolas" panose="020B0609020204030204" pitchFamily="49" charset="0"/>
+              </a:rPr>
+              <a:t>print(df</a:t>
+            </a:r>
+            <a:r>
+              <a:rPr lang="en-US" sz="1100">
+                <a:solidFill>
+                  <a:schemeClr val="accent1"/>
+                </a:solidFill>
+                <a:latin typeface="Consolas" panose="020B0609020204030204" pitchFamily="49" charset="0"/>
+              </a:rPr>
+              <a:t>.describe()</a:t>
+            </a:r>
+            <a:r>
+              <a:rPr lang="en-US" sz="1100">
+                <a:latin typeface="Consolas" panose="020B0609020204030204" pitchFamily="49" charset="0"/>
+              </a:rPr>
+              <a:t>)</a:t>
+            </a:r>
+          </a:p>
+        </p:txBody>
+      </p:sp>
+      <p:sp>
+        <p:nvSpPr>
+          <p:cNvPr id="4" name="Slide Number Placeholder 3">
+            <a:extLst>
+              <a:ext uri="{FF2B5EF4-FFF2-40B4-BE49-F238E27FC236}">
+                <a16:creationId xmlns:a16="http://schemas.microsoft.com/office/drawing/2014/main" id="{64987AE6-EC0E-43DD-9376-95A5602EE5E1}"/>
+              </a:ext>
+            </a:extLst>
+          </p:cNvPr>
+          <p:cNvSpPr>
+            <a:spLocks noGrp="1"/>
+          </p:cNvSpPr>
+          <p:nvPr>
+            <p:ph type="sldNum" idx="12"/>
+          </p:nvPr>
+        </p:nvSpPr>
+        <p:spPr/>
+        <p:txBody>
+          <a:bodyPr/>
+          <a:lstStyle/>
+          <a:p>
+            <a:pPr marL="0" lvl="0" indent="0" algn="r" rtl="0">
+              <a:spcBef>
+                <a:spcPts val="0"/>
+              </a:spcBef>
+              <a:spcAft>
+                <a:spcPts val="0"/>
+              </a:spcAft>
+              <a:buNone/>
+            </a:pPr>
+            <a:fld id="{00000000-1234-1234-1234-123412341234}" type="slidenum">
+              <a:rPr lang="en" smtClean="0"/>
+              <a:t>21</a:t>
+            </a:fld>
+            <a:endParaRPr lang="en"/>
+          </a:p>
+        </p:txBody>
+      </p:sp>
+    </p:spTree>
+    <p:extLst>
+      <p:ext uri="{BB962C8B-B14F-4D97-AF65-F5344CB8AC3E}">
+        <p14:creationId xmlns:p14="http://schemas.microsoft.com/office/powerpoint/2010/main" val="259866504"/>
+      </p:ext>
+    </p:extLst>
+  </p:cSld>
+  <p:clrMapOvr>
+    <a:masterClrMapping/>
+  </p:clrMapOvr>
+</p:sld>
+</file>
+
+<file path=ppt/slides/slide22.xml><?xml version="1.0" encoding="utf-8"?>
+<p:sld xmlns:a="http://schemas.openxmlformats.org/drawingml/2006/main" xmlns:r="http://schemas.openxmlformats.org/officeDocument/2006/relationships" xmlns:p="http://schemas.openxmlformats.org/presentationml/2006/main">
+  <p:cSld>
+    <p:spTree>
+      <p:nvGrpSpPr>
+        <p:cNvPr id="1" name=""/>
+        <p:cNvGrpSpPr/>
+        <p:nvPr/>
+      </p:nvGrpSpPr>
+      <p:grpSpPr>
+        <a:xfrm>
+          <a:off x="0" y="0"/>
+          <a:ext cx="0" cy="0"/>
+          <a:chOff x="0" y="0"/>
+          <a:chExt cx="0" cy="0"/>
+        </a:xfrm>
+      </p:grpSpPr>
+      <p:sp>
+        <p:nvSpPr>
+          <p:cNvPr id="2" name="Title 1">
+            <a:extLst>
+              <a:ext uri="{FF2B5EF4-FFF2-40B4-BE49-F238E27FC236}">
+                <a16:creationId xmlns:a16="http://schemas.microsoft.com/office/drawing/2014/main" id="{024AD384-5AD1-4435-A943-1241B2FACD62}"/>
+              </a:ext>
+            </a:extLst>
+          </p:cNvPr>
+          <p:cNvSpPr>
+            <a:spLocks noGrp="1"/>
+          </p:cNvSpPr>
+          <p:nvPr>
+            <p:ph type="title"/>
+          </p:nvPr>
+        </p:nvSpPr>
+        <p:spPr/>
+        <p:txBody>
+          <a:bodyPr/>
+          <a:lstStyle/>
+          <a:p>
+            <a:r>
+              <a:rPr lang="en-US"/>
+              <a:t>Sort and Filter</a:t>
+            </a:r>
+            <a:endParaRPr lang="fa-IR"/>
+          </a:p>
+        </p:txBody>
+      </p:sp>
+      <p:sp>
+        <p:nvSpPr>
+          <p:cNvPr id="3" name="Text Placeholder 2">
+            <a:extLst>
+              <a:ext uri="{FF2B5EF4-FFF2-40B4-BE49-F238E27FC236}">
+                <a16:creationId xmlns:a16="http://schemas.microsoft.com/office/drawing/2014/main" id="{58BE3078-8B89-4550-B497-93E4DADBD57E}"/>
+              </a:ext>
+            </a:extLst>
+          </p:cNvPr>
+          <p:cNvSpPr>
+            <a:spLocks noGrp="1"/>
+          </p:cNvSpPr>
+          <p:nvPr>
+            <p:ph type="body" idx="1"/>
+          </p:nvPr>
+        </p:nvSpPr>
+        <p:spPr>
+          <a:xfrm>
+            <a:off x="786150" y="1142608"/>
+            <a:ext cx="7571700" cy="3626431"/>
+          </a:xfrm>
+        </p:spPr>
+        <p:txBody>
+          <a:bodyPr/>
+          <a:lstStyle/>
+          <a:p>
+            <a:r>
+              <a:rPr lang="en-US" sz="1100">
+                <a:latin typeface="Consolas" panose="020B0609020204030204" pitchFamily="49" charset="0"/>
+              </a:rPr>
+              <a:t>data = {'calories': [420, 380, 390], 'duration': [50, 40, -45]}</a:t>
+            </a:r>
+          </a:p>
+          <a:p>
+            <a:r>
+              <a:rPr lang="en-US" sz="1100">
+                <a:latin typeface="Consolas" panose="020B0609020204030204" pitchFamily="49" charset="0"/>
+              </a:rPr>
+              <a:t>df = pd.DataFrame(data, index = ['day2', 'day3', 'day1'])</a:t>
+            </a:r>
+          </a:p>
+          <a:p>
+            <a:pPr marL="76200" indent="0" algn="just">
+              <a:buNone/>
+            </a:pPr>
+            <a:endParaRPr lang="en-US"/>
+          </a:p>
+          <a:p>
+            <a:pPr marL="76200" indent="0" algn="just">
+              <a:buNone/>
+            </a:pPr>
+            <a:r>
+              <a:rPr lang="en-US"/>
+              <a:t>Sort</a:t>
+            </a:r>
+          </a:p>
+          <a:p>
+            <a:pPr marL="76200" indent="0" algn="just">
+              <a:buNone/>
+            </a:pPr>
+            <a:r>
+              <a:rPr lang="en-US" sz="1100">
+                <a:latin typeface="Consolas" panose="020B0609020204030204" pitchFamily="49" charset="0"/>
+              </a:rPr>
+              <a:t>print(df</a:t>
+            </a:r>
+            <a:r>
+              <a:rPr lang="en-US" sz="1100">
+                <a:solidFill>
+                  <a:schemeClr val="accent1"/>
+                </a:solidFill>
+                <a:latin typeface="Consolas" panose="020B0609020204030204" pitchFamily="49" charset="0"/>
+              </a:rPr>
+              <a:t>.sort_index()</a:t>
+            </a:r>
+            <a:r>
+              <a:rPr lang="en-US" sz="1100">
+                <a:latin typeface="Consolas" panose="020B0609020204030204" pitchFamily="49" charset="0"/>
+              </a:rPr>
+              <a:t>)</a:t>
+            </a:r>
+          </a:p>
+          <a:p>
+            <a:pPr marL="76200" indent="0" algn="just">
+              <a:buNone/>
+            </a:pPr>
+            <a:r>
+              <a:rPr lang="en-US" sz="1100">
+                <a:latin typeface="Consolas" panose="020B0609020204030204" pitchFamily="49" charset="0"/>
+              </a:rPr>
+              <a:t>print(df</a:t>
+            </a:r>
+            <a:r>
+              <a:rPr lang="en-US" sz="1100">
+                <a:solidFill>
+                  <a:schemeClr val="accent1"/>
+                </a:solidFill>
+                <a:latin typeface="Consolas" panose="020B0609020204030204" pitchFamily="49" charset="0"/>
+              </a:rPr>
+              <a:t>.sort_values(by </a:t>
+            </a:r>
+            <a:r>
+              <a:rPr lang="en-US" sz="1100">
+                <a:latin typeface="Consolas" panose="020B0609020204030204" pitchFamily="49" charset="0"/>
+              </a:rPr>
+              <a:t>= 'calories'</a:t>
+            </a:r>
+            <a:r>
+              <a:rPr lang="en-US" sz="1100">
+                <a:solidFill>
+                  <a:schemeClr val="accent1"/>
+                </a:solidFill>
+                <a:latin typeface="Consolas" panose="020B0609020204030204" pitchFamily="49" charset="0"/>
+              </a:rPr>
+              <a:t>)</a:t>
+            </a:r>
+            <a:r>
+              <a:rPr lang="en-US" sz="1100">
+                <a:latin typeface="Consolas" panose="020B0609020204030204" pitchFamily="49" charset="0"/>
+              </a:rPr>
+              <a:t>)</a:t>
+            </a:r>
+          </a:p>
+          <a:p>
+            <a:pPr marL="76200" indent="0" algn="just">
+              <a:buNone/>
+            </a:pPr>
+            <a:endParaRPr lang="en-US" sz="1100">
+              <a:latin typeface="Consolas" panose="020B0609020204030204" pitchFamily="49" charset="0"/>
+            </a:endParaRPr>
+          </a:p>
+          <a:p>
+            <a:pPr marL="76200" indent="0" algn="just">
+              <a:buNone/>
+            </a:pPr>
+            <a:r>
+              <a:rPr lang="en-US"/>
+              <a:t>Filter</a:t>
+            </a:r>
+          </a:p>
+          <a:p>
+            <a:pPr marL="76200" indent="0" algn="just">
+              <a:buNone/>
+            </a:pPr>
+            <a:r>
+              <a:rPr lang="en-US" sz="1100">
+                <a:latin typeface="Consolas" panose="020B0609020204030204" pitchFamily="49" charset="0"/>
+              </a:rPr>
+              <a:t>df[df['duration'] &gt; 0]</a:t>
+            </a:r>
+          </a:p>
+          <a:p>
+            <a:pPr marL="76200" indent="0" algn="just">
+              <a:buNone/>
+            </a:pPr>
+            <a:r>
+              <a:rPr lang="en-US" sz="1100">
+                <a:latin typeface="Consolas" panose="020B0609020204030204" pitchFamily="49" charset="0"/>
+              </a:rPr>
+              <a:t>df[df &lt; 0] = -df</a:t>
+            </a:r>
+          </a:p>
+        </p:txBody>
+      </p:sp>
+      <p:sp>
+        <p:nvSpPr>
+          <p:cNvPr id="4" name="Slide Number Placeholder 3">
+            <a:extLst>
+              <a:ext uri="{FF2B5EF4-FFF2-40B4-BE49-F238E27FC236}">
+                <a16:creationId xmlns:a16="http://schemas.microsoft.com/office/drawing/2014/main" id="{64987AE6-EC0E-43DD-9376-95A5602EE5E1}"/>
+              </a:ext>
+            </a:extLst>
+          </p:cNvPr>
+          <p:cNvSpPr>
+            <a:spLocks noGrp="1"/>
+          </p:cNvSpPr>
+          <p:nvPr>
+            <p:ph type="sldNum" idx="12"/>
+          </p:nvPr>
+        </p:nvSpPr>
+        <p:spPr/>
+        <p:txBody>
+          <a:bodyPr/>
+          <a:lstStyle/>
+          <a:p>
+            <a:pPr marL="0" lvl="0" indent="0" algn="r" rtl="0">
+              <a:spcBef>
+                <a:spcPts val="0"/>
+              </a:spcBef>
+              <a:spcAft>
+                <a:spcPts val="0"/>
+              </a:spcAft>
+              <a:buNone/>
+            </a:pPr>
+            <a:fld id="{00000000-1234-1234-1234-123412341234}" type="slidenum">
+              <a:rPr lang="en" smtClean="0"/>
+              <a:t>22</a:t>
+            </a:fld>
+            <a:endParaRPr lang="en"/>
+          </a:p>
+        </p:txBody>
+      </p:sp>
+    </p:spTree>
+    <p:extLst>
+      <p:ext uri="{BB962C8B-B14F-4D97-AF65-F5344CB8AC3E}">
+        <p14:creationId xmlns:p14="http://schemas.microsoft.com/office/powerpoint/2010/main" val="1285548710"/>
+      </p:ext>
+    </p:extLst>
+  </p:cSld>
+  <p:clrMapOvr>
+    <a:masterClrMapping/>
+  </p:clrMapOvr>
+</p:sld>
+</file>
+
+<file path=ppt/slides/slide23.xml><?xml version="1.0" encoding="utf-8"?>
+<p:sld xmlns:a="http://schemas.openxmlformats.org/drawingml/2006/main" xmlns:r="http://schemas.openxmlformats.org/officeDocument/2006/relationships" xmlns:p="http://schemas.openxmlformats.org/presentationml/2006/main">
+  <p:cSld>
+    <p:spTree>
+      <p:nvGrpSpPr>
+        <p:cNvPr id="1" name=""/>
+        <p:cNvGrpSpPr/>
+        <p:nvPr/>
+      </p:nvGrpSpPr>
+      <p:grpSpPr>
+        <a:xfrm>
+          <a:off x="0" y="0"/>
+          <a:ext cx="0" cy="0"/>
+          <a:chOff x="0" y="0"/>
+          <a:chExt cx="0" cy="0"/>
+        </a:xfrm>
+      </p:grpSpPr>
+      <p:sp>
+        <p:nvSpPr>
+          <p:cNvPr id="2" name="Title 1">
+            <a:extLst>
+              <a:ext uri="{FF2B5EF4-FFF2-40B4-BE49-F238E27FC236}">
+                <a16:creationId xmlns:a16="http://schemas.microsoft.com/office/drawing/2014/main" id="{024AD384-5AD1-4435-A943-1241B2FACD62}"/>
+              </a:ext>
+            </a:extLst>
+          </p:cNvPr>
+          <p:cNvSpPr>
+            <a:spLocks noGrp="1"/>
+          </p:cNvSpPr>
+          <p:nvPr>
+            <p:ph type="title"/>
+          </p:nvPr>
+        </p:nvSpPr>
+        <p:spPr/>
+        <p:txBody>
+          <a:bodyPr/>
+          <a:lstStyle/>
+          <a:p>
+            <a:r>
+              <a:rPr lang="en-US"/>
               <a:t>Data Cleaning</a:t>
             </a:r>
             <a:endParaRPr lang="fa-IR"/>
@@ -15083,6 +15613,16 @@
               <a:rPr lang="en-US"/>
               <a:t>: row 18, 22, and 28.</a:t>
             </a:r>
+          </a:p>
+          <a:p>
+            <a:r>
+              <a:rPr lang="en-US" sz="1100">
+                <a:latin typeface="Consolas" panose="020B0609020204030204" pitchFamily="49" charset="0"/>
+              </a:rPr>
+              <a:t>isna()  dropna()  fillna()</a:t>
+            </a:r>
+          </a:p>
+          <a:p>
             <a:endParaRPr lang="en-US" sz="1100">
               <a:latin typeface="Consolas" panose="020B0609020204030204" pitchFamily="49" charset="0"/>
             </a:endParaRPr>
@@ -15104,6 +15644,16 @@
               <a:rPr lang="en-US"/>
               <a:t>: row 26.</a:t>
             </a:r>
+          </a:p>
+          <a:p>
+            <a:r>
+              <a:rPr lang="en-US" sz="1100">
+                <a:latin typeface="Consolas" panose="020B0609020204030204" pitchFamily="49" charset="0"/>
+              </a:rPr>
+              <a:t>dtype  astype()  to_numeric()  to_datetime()</a:t>
+            </a:r>
+          </a:p>
+          <a:p>
             <a:endParaRPr lang="en-US" sz="1100">
               <a:latin typeface="Consolas" panose="020B0609020204030204" pitchFamily="49" charset="0"/>
             </a:endParaRPr>
@@ -15125,6 +15675,16 @@
               <a:rPr lang="en-US"/>
               <a:t>: row 7.</a:t>
             </a:r>
+          </a:p>
+          <a:p>
+            <a:r>
+              <a:rPr lang="en-US" sz="1100">
+                <a:latin typeface="Consolas" panose="020B0609020204030204" pitchFamily="49" charset="0"/>
+              </a:rPr>
+              <a:t>loc[]  iloc[]</a:t>
+            </a:r>
+          </a:p>
+          <a:p>
             <a:endParaRPr lang="en-US" sz="1100">
               <a:latin typeface="Consolas" panose="020B0609020204030204" pitchFamily="49" charset="0"/>
             </a:endParaRPr>
@@ -15145,6 +15705,14 @@
             <a:r>
               <a:rPr lang="en-US"/>
               <a:t>: row 11 and 12.</a:t>
+            </a:r>
+          </a:p>
+          <a:p>
+            <a:r>
+              <a:rPr lang="en-US" sz="1100">
+                <a:latin typeface="Consolas" panose="020B0609020204030204" pitchFamily="49" charset="0"/>
+              </a:rPr>
+              <a:t>duplicated()  drop_duplicates()</a:t>
             </a:r>
           </a:p>
         </p:txBody>
@@ -15181,7 +15749,7 @@
             </a:pPr>
             <a:fld id="{00000000-1234-1234-1234-123412341234}" type="slidenum">
               <a:rPr lang="en" smtClean="0"/>
-              <a:t>21</a:t>
+              <a:t>23</a:t>
             </a:fld>
             <a:endParaRPr lang="en"/>
           </a:p>
@@ -15229,7 +15797,7 @@
 </p:sld>
 </file>
 
-<file path=ppt/slides/slide22.xml><?xml version="1.0" encoding="utf-8"?>
+<file path=ppt/slides/slide24.xml><?xml version="1.0" encoding="utf-8"?>
 <p:sld xmlns:a="http://schemas.openxmlformats.org/drawingml/2006/main" xmlns:r="http://schemas.openxmlformats.org/officeDocument/2006/relationships" xmlns:p="http://schemas.openxmlformats.org/presentationml/2006/main">
   <p:cSld>
     <p:spTree>
@@ -15339,7 +15907,7 @@
             </a:pPr>
             <a:fld id="{00000000-1234-1234-1234-123412341234}" type="slidenum">
               <a:rPr lang="en"/>
-              <a:t>22</a:t>
+              <a:t>24</a:t>
             </a:fld>
             <a:endParaRPr/>
           </a:p>
@@ -15358,7 +15926,7 @@
 </p:sld>
 </file>
 
-<file path=ppt/slides/slide23.xml><?xml version="1.0" encoding="utf-8"?>
+<file path=ppt/slides/slide25.xml><?xml version="1.0" encoding="utf-8"?>
 <p:sld xmlns:a="http://schemas.openxmlformats.org/drawingml/2006/main" xmlns:r="http://schemas.openxmlformats.org/officeDocument/2006/relationships" xmlns:p="http://schemas.openxmlformats.org/presentationml/2006/main">
   <p:cSld>
     <p:spTree>
@@ -15468,7 +16036,7 @@
             </a:pPr>
             <a:fld id="{00000000-1234-1234-1234-123412341234}" type="slidenum">
               <a:rPr lang="en"/>
-              <a:t>23</a:t>
+              <a:t>25</a:t>
             </a:fld>
             <a:endParaRPr/>
           </a:p>
@@ -15487,7 +16055,7 @@
 </p:sld>
 </file>
 
-<file path=ppt/slides/slide24.xml><?xml version="1.0" encoding="utf-8"?>
+<file path=ppt/slides/slide26.xml><?xml version="1.0" encoding="utf-8"?>
 <p:sld xmlns:a="http://schemas.openxmlformats.org/drawingml/2006/main" xmlns:r="http://schemas.openxmlformats.org/officeDocument/2006/relationships" xmlns:p="http://schemas.openxmlformats.org/presentationml/2006/main">
   <p:cSld>
     <p:spTree>
@@ -15740,7 +16308,7 @@
             </a:pPr>
             <a:fld id="{00000000-1234-1234-1234-123412341234}" type="slidenum">
               <a:rPr lang="en"/>
-              <a:t>24</a:t>
+              <a:t>26</a:t>
             </a:fld>
             <a:endParaRPr/>
           </a:p>

</xml_diff>

<commit_message>
add mpl markers and line
</commit_message>
<xml_diff>
--- a/Powerpoint/2 Data Science.pptx
+++ b/Powerpoint/2 Data Science.pptx
@@ -5,10 +5,10 @@
     <p:sldMasterId id="2147483658" r:id="rId1"/>
   </p:sldMasterIdLst>
   <p:notesMasterIdLst>
-    <p:notesMasterId r:id="rId31"/>
+    <p:notesMasterId r:id="rId32"/>
   </p:notesMasterIdLst>
   <p:handoutMasterIdLst>
-    <p:handoutMasterId r:id="rId32"/>
+    <p:handoutMasterId r:id="rId33"/>
   </p:handoutMasterIdLst>
   <p:sldIdLst>
     <p:sldId id="256" r:id="rId2"/>
@@ -39,36 +39,37 @@
     <p:sldId id="358" r:id="rId27"/>
     <p:sldId id="359" r:id="rId28"/>
     <p:sldId id="361" r:id="rId29"/>
-    <p:sldId id="280" r:id="rId30"/>
+    <p:sldId id="362" r:id="rId30"/>
+    <p:sldId id="280" r:id="rId31"/>
   </p:sldIdLst>
   <p:sldSz cx="9144000" cy="5143500" type="screen16x9"/>
   <p:notesSz cx="6858000" cy="9144000"/>
   <p:embeddedFontLst>
     <p:embeddedFont>
       <p:font typeface="Consolas" panose="020B0609020204030204" pitchFamily="49" charset="0"/>
-      <p:regular r:id="rId33"/>
-      <p:bold r:id="rId34"/>
-      <p:italic r:id="rId35"/>
-      <p:boldItalic r:id="rId36"/>
+      <p:regular r:id="rId34"/>
+      <p:bold r:id="rId35"/>
+      <p:italic r:id="rId36"/>
+      <p:boldItalic r:id="rId37"/>
     </p:embeddedFont>
     <p:embeddedFont>
       <p:font typeface="Roboto Slab" panose="020B0604020202020204" charset="0"/>
-      <p:regular r:id="rId37"/>
-      <p:bold r:id="rId38"/>
+      <p:regular r:id="rId38"/>
+      <p:bold r:id="rId39"/>
     </p:embeddedFont>
     <p:embeddedFont>
       <p:font typeface="Source Sans Pro" panose="020B0503030403020204" pitchFamily="34" charset="0"/>
-      <p:regular r:id="rId39"/>
-      <p:bold r:id="rId40"/>
-      <p:italic r:id="rId41"/>
-      <p:boldItalic r:id="rId42"/>
+      <p:regular r:id="rId40"/>
+      <p:bold r:id="rId41"/>
+      <p:italic r:id="rId42"/>
+      <p:boldItalic r:id="rId43"/>
     </p:embeddedFont>
     <p:embeddedFont>
       <p:font typeface="Trebuchet MS" panose="020B0603020202020204" pitchFamily="34" charset="0"/>
-      <p:regular r:id="rId43"/>
-      <p:bold r:id="rId44"/>
-      <p:italic r:id="rId45"/>
-      <p:boldItalic r:id="rId46"/>
+      <p:regular r:id="rId44"/>
+      <p:bold r:id="rId45"/>
+      <p:italic r:id="rId46"/>
+      <p:boldItalic r:id="rId47"/>
     </p:embeddedFont>
   </p:embeddedFontLst>
   <p:defaultTextStyle>
@@ -16772,7 +16773,7 @@
           <a:p>
             <a:r>
               <a:rPr lang="en-US"/>
-              <a:t>Format Strings</a:t>
+              <a:t>Markers and Line</a:t>
             </a:r>
             <a:endParaRPr lang="fa-IR"/>
           </a:p>
@@ -16840,59 +16841,35 @@
             </a:pPr>
             <a:r>
               <a:rPr lang="en-US" sz="1100">
+                <a:latin typeface="Consolas" panose="020B0609020204030204" pitchFamily="49" charset="0"/>
+              </a:rPr>
+              <a:t>marker, line, color = '*', '--', 'g'</a:t>
+            </a:r>
+          </a:p>
+          <a:p>
+            <a:pPr marL="76200" indent="0" algn="just">
+              <a:buNone/>
+            </a:pPr>
+            <a:r>
+              <a:rPr lang="en-US" sz="1100">
+                <a:latin typeface="Consolas" panose="020B0609020204030204" pitchFamily="49" charset="0"/>
+              </a:rPr>
+              <a:t>plt.plot(xpoints, ypoints, </a:t>
+            </a:r>
+            <a:r>
+              <a:rPr lang="en-US" sz="1100">
                 <a:solidFill>
                   <a:schemeClr val="accent1"/>
                 </a:solidFill>
                 <a:latin typeface="Consolas" panose="020B0609020204030204" pitchFamily="49" charset="0"/>
               </a:rPr>
-              <a:t>marker</a:t>
-            </a:r>
-            <a:r>
-              <a:rPr lang="en-US" sz="1100">
-                <a:latin typeface="Consolas" panose="020B0609020204030204" pitchFamily="49" charset="0"/>
-              </a:rPr>
-              <a:t>, </a:t>
-            </a:r>
-            <a:r>
-              <a:rPr lang="en-US" sz="1100">
-                <a:solidFill>
-                  <a:schemeClr val="accent1"/>
-                </a:solidFill>
-                <a:latin typeface="Consolas" panose="020B0609020204030204" pitchFamily="49" charset="0"/>
-              </a:rPr>
-              <a:t>line</a:t>
-            </a:r>
-            <a:r>
-              <a:rPr lang="en-US" sz="1100">
-                <a:latin typeface="Consolas" panose="020B0609020204030204" pitchFamily="49" charset="0"/>
-              </a:rPr>
-              <a:t>, </a:t>
-            </a:r>
-            <a:r>
-              <a:rPr lang="en-US" sz="1100">
-                <a:solidFill>
-                  <a:schemeClr val="accent1"/>
-                </a:solidFill>
-                <a:latin typeface="Consolas" panose="020B0609020204030204" pitchFamily="49" charset="0"/>
-              </a:rPr>
-              <a:t>color</a:t>
-            </a:r>
-            <a:r>
-              <a:rPr lang="en-US" sz="1100">
-                <a:latin typeface="Consolas" panose="020B0609020204030204" pitchFamily="49" charset="0"/>
-              </a:rPr>
-              <a:t> = '*', '--', 'g'</a:t>
-            </a:r>
-          </a:p>
-          <a:p>
-            <a:pPr marL="76200" indent="0" algn="just">
-              <a:buNone/>
-            </a:pPr>
-            <a:r>
-              <a:rPr lang="en-US" sz="1100">
-                <a:latin typeface="Consolas" panose="020B0609020204030204" pitchFamily="49" charset="0"/>
-              </a:rPr>
-              <a:t>plt.plot(xpoints, ypoints, f'{marker}{line}{color}')</a:t>
+              <a:t>f'{marker}{line}{color}'</a:t>
+            </a:r>
+            <a:r>
+              <a:rPr lang="en-US" sz="1100">
+                <a:latin typeface="Consolas" panose="020B0609020204030204" pitchFamily="49" charset="0"/>
+              </a:rPr>
+              <a:t>)</a:t>
             </a:r>
           </a:p>
           <a:p>
@@ -16917,7 +16894,7 @@
           <a:p>
             <a:r>
               <a:rPr lang="en-US"/>
-              <a:t>Marker, line, and color</a:t>
+              <a:t>fmt reference</a:t>
             </a:r>
             <a:endParaRPr lang="en-US">
               <a:latin typeface="Consolas" panose="020B0609020204030204" pitchFamily="49" charset="0"/>
@@ -17013,6 +16990,450 @@
 </file>
 
 <file path=ppt/slides/slide29.xml><?xml version="1.0" encoding="utf-8"?>
+<p:sld xmlns:a="http://schemas.openxmlformats.org/drawingml/2006/main" xmlns:r="http://schemas.openxmlformats.org/officeDocument/2006/relationships" xmlns:p="http://schemas.openxmlformats.org/presentationml/2006/main">
+  <p:cSld>
+    <p:spTree>
+      <p:nvGrpSpPr>
+        <p:cNvPr id="1" name=""/>
+        <p:cNvGrpSpPr/>
+        <p:nvPr/>
+      </p:nvGrpSpPr>
+      <p:grpSpPr>
+        <a:xfrm>
+          <a:off x="0" y="0"/>
+          <a:ext cx="0" cy="0"/>
+          <a:chOff x="0" y="0"/>
+          <a:chExt cx="0" cy="0"/>
+        </a:xfrm>
+      </p:grpSpPr>
+      <p:sp>
+        <p:nvSpPr>
+          <p:cNvPr id="2" name="Title 1">
+            <a:extLst>
+              <a:ext uri="{FF2B5EF4-FFF2-40B4-BE49-F238E27FC236}">
+                <a16:creationId xmlns:a16="http://schemas.microsoft.com/office/drawing/2014/main" id="{024AD384-5AD1-4435-A943-1241B2FACD62}"/>
+              </a:ext>
+            </a:extLst>
+          </p:cNvPr>
+          <p:cNvSpPr>
+            <a:spLocks noGrp="1"/>
+          </p:cNvSpPr>
+          <p:nvPr>
+            <p:ph type="title"/>
+          </p:nvPr>
+        </p:nvSpPr>
+        <p:spPr/>
+        <p:txBody>
+          <a:bodyPr/>
+          <a:lstStyle/>
+          <a:p>
+            <a:r>
+              <a:rPr lang="en-US"/>
+              <a:t>Markers and Line</a:t>
+            </a:r>
+            <a:endParaRPr lang="fa-IR"/>
+          </a:p>
+        </p:txBody>
+      </p:sp>
+      <p:sp>
+        <p:nvSpPr>
+          <p:cNvPr id="3" name="Text Placeholder 2">
+            <a:extLst>
+              <a:ext uri="{FF2B5EF4-FFF2-40B4-BE49-F238E27FC236}">
+                <a16:creationId xmlns:a16="http://schemas.microsoft.com/office/drawing/2014/main" id="{58BE3078-8B89-4550-B497-93E4DADBD57E}"/>
+              </a:ext>
+            </a:extLst>
+          </p:cNvPr>
+          <p:cNvSpPr>
+            <a:spLocks noGrp="1"/>
+          </p:cNvSpPr>
+          <p:nvPr>
+            <p:ph type="body" idx="1"/>
+          </p:nvPr>
+        </p:nvSpPr>
+        <p:spPr>
+          <a:xfrm>
+            <a:off x="786150" y="1142608"/>
+            <a:ext cx="7571700" cy="3626431"/>
+          </a:xfrm>
+        </p:spPr>
+        <p:txBody>
+          <a:bodyPr/>
+          <a:lstStyle/>
+          <a:p>
+            <a:pPr marL="76200" indent="0" algn="just">
+              <a:buNone/>
+            </a:pPr>
+            <a:r>
+              <a:rPr lang="en-US"/>
+              <a:t>Multiple Lines</a:t>
+            </a:r>
+            <a:endParaRPr lang="en-US" sz="1400"/>
+          </a:p>
+          <a:p>
+            <a:pPr marL="76200" indent="0" algn="just">
+              <a:buNone/>
+            </a:pPr>
+            <a:r>
+              <a:rPr lang="en-US" sz="1100">
+                <a:latin typeface="Consolas" panose="020B0609020204030204" pitchFamily="49" charset="0"/>
+              </a:rPr>
+              <a:t>y1 = np.array([3, 8, 1, 10])</a:t>
+            </a:r>
+          </a:p>
+          <a:p>
+            <a:pPr marL="76200" indent="0" algn="just">
+              <a:buNone/>
+            </a:pPr>
+            <a:r>
+              <a:rPr lang="en-US" sz="1100">
+                <a:latin typeface="Consolas" panose="020B0609020204030204" pitchFamily="49" charset="0"/>
+              </a:rPr>
+              <a:t>y2 = np.array([6, 2, 7, 11])</a:t>
+            </a:r>
+          </a:p>
+          <a:p>
+            <a:pPr marL="76200" indent="0" algn="just">
+              <a:buNone/>
+            </a:pPr>
+            <a:r>
+              <a:rPr lang="en-US" sz="1100">
+                <a:latin typeface="Consolas" panose="020B0609020204030204" pitchFamily="49" charset="0"/>
+              </a:rPr>
+              <a:t>plt.plot(y1, </a:t>
+            </a:r>
+            <a:r>
+              <a:rPr lang="en-US" sz="1100">
+                <a:solidFill>
+                  <a:schemeClr val="accent1"/>
+                </a:solidFill>
+                <a:latin typeface="Consolas" panose="020B0609020204030204" pitchFamily="49" charset="0"/>
+              </a:rPr>
+              <a:t>marker</a:t>
+            </a:r>
+            <a:r>
+              <a:rPr lang="en-US" sz="1100">
+                <a:latin typeface="Consolas" panose="020B0609020204030204" pitchFamily="49" charset="0"/>
+              </a:rPr>
+              <a:t> = '', </a:t>
+            </a:r>
+            <a:r>
+              <a:rPr lang="en-US" sz="1100">
+                <a:solidFill>
+                  <a:schemeClr val="accent1"/>
+                </a:solidFill>
+                <a:latin typeface="Consolas" panose="020B0609020204030204" pitchFamily="49" charset="0"/>
+              </a:rPr>
+              <a:t>linestyle</a:t>
+            </a:r>
+            <a:r>
+              <a:rPr lang="en-US" sz="1100">
+                <a:latin typeface="Consolas" panose="020B0609020204030204" pitchFamily="49" charset="0"/>
+              </a:rPr>
+              <a:t> = ':', </a:t>
+            </a:r>
+            <a:r>
+              <a:rPr lang="en-US" sz="1100">
+                <a:solidFill>
+                  <a:schemeClr val="accent1"/>
+                </a:solidFill>
+                <a:latin typeface="Consolas" panose="020B0609020204030204" pitchFamily="49" charset="0"/>
+              </a:rPr>
+              <a:t>color</a:t>
+            </a:r>
+            <a:r>
+              <a:rPr lang="en-US" sz="1100">
+                <a:latin typeface="Consolas" panose="020B0609020204030204" pitchFamily="49" charset="0"/>
+              </a:rPr>
+              <a:t> = '#4CAF50')</a:t>
+            </a:r>
+          </a:p>
+          <a:p>
+            <a:pPr marL="76200" indent="0" algn="just">
+              <a:buNone/>
+            </a:pPr>
+            <a:r>
+              <a:rPr lang="en-US" sz="1100">
+                <a:latin typeface="Consolas" panose="020B0609020204030204" pitchFamily="49" charset="0"/>
+              </a:rPr>
+              <a:t>plt.plot(y2, 'o-.r', </a:t>
+            </a:r>
+            <a:r>
+              <a:rPr lang="en-US" sz="1100">
+                <a:solidFill>
+                  <a:schemeClr val="accent1"/>
+                </a:solidFill>
+                <a:latin typeface="Consolas" panose="020B0609020204030204" pitchFamily="49" charset="0"/>
+              </a:rPr>
+              <a:t>markersize</a:t>
+            </a:r>
+            <a:r>
+              <a:rPr lang="en-US" sz="1100">
+                <a:latin typeface="Consolas" panose="020B0609020204030204" pitchFamily="49" charset="0"/>
+              </a:rPr>
+              <a:t> = 9, </a:t>
+            </a:r>
+            <a:r>
+              <a:rPr lang="en-US" sz="1100">
+                <a:solidFill>
+                  <a:schemeClr val="accent1"/>
+                </a:solidFill>
+                <a:latin typeface="Consolas" panose="020B0609020204030204" pitchFamily="49" charset="0"/>
+              </a:rPr>
+              <a:t>linewidth</a:t>
+            </a:r>
+            <a:r>
+              <a:rPr lang="en-US" sz="1100">
+                <a:latin typeface="Consolas" panose="020B0609020204030204" pitchFamily="49" charset="0"/>
+              </a:rPr>
+              <a:t> = 3)</a:t>
+            </a:r>
+          </a:p>
+          <a:p>
+            <a:pPr marL="76200" indent="0" algn="just">
+              <a:buNone/>
+            </a:pPr>
+            <a:r>
+              <a:rPr lang="en-US" sz="1100">
+                <a:latin typeface="Consolas" panose="020B0609020204030204" pitchFamily="49" charset="0"/>
+              </a:rPr>
+              <a:t>plt.show()</a:t>
+            </a:r>
+          </a:p>
+        </p:txBody>
+      </p:sp>
+      <p:sp>
+        <p:nvSpPr>
+          <p:cNvPr id="4" name="Slide Number Placeholder 3">
+            <a:extLst>
+              <a:ext uri="{FF2B5EF4-FFF2-40B4-BE49-F238E27FC236}">
+                <a16:creationId xmlns:a16="http://schemas.microsoft.com/office/drawing/2014/main" id="{64987AE6-EC0E-43DD-9376-95A5602EE5E1}"/>
+              </a:ext>
+            </a:extLst>
+          </p:cNvPr>
+          <p:cNvSpPr>
+            <a:spLocks noGrp="1"/>
+          </p:cNvSpPr>
+          <p:nvPr>
+            <p:ph type="sldNum" idx="12"/>
+          </p:nvPr>
+        </p:nvSpPr>
+        <p:spPr/>
+        <p:txBody>
+          <a:bodyPr/>
+          <a:lstStyle/>
+          <a:p>
+            <a:pPr marL="0" lvl="0" indent="0" algn="r" rtl="0">
+              <a:spcBef>
+                <a:spcPts val="0"/>
+              </a:spcBef>
+              <a:spcAft>
+                <a:spcPts val="0"/>
+              </a:spcAft>
+              <a:buNone/>
+            </a:pPr>
+            <a:fld id="{00000000-1234-1234-1234-123412341234}" type="slidenum">
+              <a:rPr lang="en" smtClean="0"/>
+              <a:t>29</a:t>
+            </a:fld>
+            <a:endParaRPr lang="en"/>
+          </a:p>
+        </p:txBody>
+      </p:sp>
+    </p:spTree>
+    <p:extLst>
+      <p:ext uri="{BB962C8B-B14F-4D97-AF65-F5344CB8AC3E}">
+        <p14:creationId xmlns:p14="http://schemas.microsoft.com/office/powerpoint/2010/main" val="2946997255"/>
+      </p:ext>
+    </p:extLst>
+  </p:cSld>
+  <p:clrMapOvr>
+    <a:masterClrMapping/>
+  </p:clrMapOvr>
+</p:sld>
+</file>
+
+<file path=ppt/slides/slide3.xml><?xml version="1.0" encoding="utf-8"?>
+<p:sld xmlns:a="http://schemas.openxmlformats.org/drawingml/2006/main" xmlns:r="http://schemas.openxmlformats.org/officeDocument/2006/relationships" xmlns:p="http://schemas.openxmlformats.org/presentationml/2006/main">
+  <p:cSld>
+    <p:spTree>
+      <p:nvGrpSpPr>
+        <p:cNvPr id="1" name=""/>
+        <p:cNvGrpSpPr/>
+        <p:nvPr/>
+      </p:nvGrpSpPr>
+      <p:grpSpPr>
+        <a:xfrm>
+          <a:off x="0" y="0"/>
+          <a:ext cx="0" cy="0"/>
+          <a:chOff x="0" y="0"/>
+          <a:chExt cx="0" cy="0"/>
+        </a:xfrm>
+      </p:grpSpPr>
+      <p:sp>
+        <p:nvSpPr>
+          <p:cNvPr id="2" name="Title 1">
+            <a:extLst>
+              <a:ext uri="{FF2B5EF4-FFF2-40B4-BE49-F238E27FC236}">
+                <a16:creationId xmlns:a16="http://schemas.microsoft.com/office/drawing/2014/main" id="{024AD384-5AD1-4435-A943-1241B2FACD62}"/>
+              </a:ext>
+            </a:extLst>
+          </p:cNvPr>
+          <p:cNvSpPr>
+            <a:spLocks noGrp="1"/>
+          </p:cNvSpPr>
+          <p:nvPr>
+            <p:ph type="title"/>
+          </p:nvPr>
+        </p:nvSpPr>
+        <p:spPr/>
+        <p:txBody>
+          <a:bodyPr/>
+          <a:lstStyle/>
+          <a:p>
+            <a:r>
+              <a:rPr lang="en-US"/>
+              <a:t>Data Science</a:t>
+            </a:r>
+            <a:endParaRPr lang="fa-IR"/>
+          </a:p>
+        </p:txBody>
+      </p:sp>
+      <p:sp>
+        <p:nvSpPr>
+          <p:cNvPr id="3" name="Text Placeholder 2">
+            <a:extLst>
+              <a:ext uri="{FF2B5EF4-FFF2-40B4-BE49-F238E27FC236}">
+                <a16:creationId xmlns:a16="http://schemas.microsoft.com/office/drawing/2014/main" id="{58BE3078-8B89-4550-B497-93E4DADBD57E}"/>
+              </a:ext>
+            </a:extLst>
+          </p:cNvPr>
+          <p:cNvSpPr>
+            <a:spLocks noGrp="1"/>
+          </p:cNvSpPr>
+          <p:nvPr>
+            <p:ph type="body" idx="1"/>
+          </p:nvPr>
+        </p:nvSpPr>
+        <p:spPr>
+          <a:xfrm>
+            <a:off x="786150" y="1142608"/>
+            <a:ext cx="3785850" cy="3626431"/>
+          </a:xfrm>
+        </p:spPr>
+        <p:txBody>
+          <a:bodyPr/>
+          <a:lstStyle/>
+          <a:p>
+            <a:pPr marL="76200" indent="0" algn="just">
+              <a:buNone/>
+            </a:pPr>
+            <a:r>
+              <a:rPr lang="en-US" sz="1400"/>
+              <a:t>A Data Scientist helps companies with data-driven decisions, to make their business better.</a:t>
+            </a:r>
+          </a:p>
+          <a:p>
+            <a:pPr marL="76200" indent="0" algn="just">
+              <a:buNone/>
+            </a:pPr>
+            <a:r>
+              <a:rPr lang="en-US" sz="1400"/>
+              <a:t>Data Science is a combination of multiple disciplines that uses statistics, data analysis, and machine learning to analyze data and to extract knowledge and insights from it.</a:t>
+            </a:r>
+          </a:p>
+          <a:p>
+            <a:pPr marL="76200" indent="0" algn="just">
+              <a:buNone/>
+            </a:pPr>
+            <a:r>
+              <a:rPr lang="en-US" sz="1400"/>
+              <a:t>Data Science is about data gathering, finding patterns in data, data analysis, make future predictions and decision-making.</a:t>
+            </a:r>
+          </a:p>
+        </p:txBody>
+      </p:sp>
+      <p:sp>
+        <p:nvSpPr>
+          <p:cNvPr id="4" name="Slide Number Placeholder 3">
+            <a:extLst>
+              <a:ext uri="{FF2B5EF4-FFF2-40B4-BE49-F238E27FC236}">
+                <a16:creationId xmlns:a16="http://schemas.microsoft.com/office/drawing/2014/main" id="{64987AE6-EC0E-43DD-9376-95A5602EE5E1}"/>
+              </a:ext>
+            </a:extLst>
+          </p:cNvPr>
+          <p:cNvSpPr>
+            <a:spLocks noGrp="1"/>
+          </p:cNvSpPr>
+          <p:nvPr>
+            <p:ph type="sldNum" idx="12"/>
+          </p:nvPr>
+        </p:nvSpPr>
+        <p:spPr/>
+        <p:txBody>
+          <a:bodyPr/>
+          <a:lstStyle/>
+          <a:p>
+            <a:pPr marL="0" lvl="0" indent="0" algn="r" rtl="0">
+              <a:spcBef>
+                <a:spcPts val="0"/>
+              </a:spcBef>
+              <a:spcAft>
+                <a:spcPts val="0"/>
+              </a:spcAft>
+              <a:buNone/>
+            </a:pPr>
+            <a:fld id="{00000000-1234-1234-1234-123412341234}" type="slidenum">
+              <a:rPr lang="en" smtClean="0"/>
+              <a:t>3</a:t>
+            </a:fld>
+            <a:endParaRPr lang="en"/>
+          </a:p>
+        </p:txBody>
+      </p:sp>
+      <p:pic>
+        <p:nvPicPr>
+          <p:cNvPr id="6" name="Picture 5">
+            <a:extLst>
+              <a:ext uri="{FF2B5EF4-FFF2-40B4-BE49-F238E27FC236}">
+                <a16:creationId xmlns:a16="http://schemas.microsoft.com/office/drawing/2014/main" id="{6D0C871E-937D-487A-B5C4-609476DCC06C}"/>
+              </a:ext>
+            </a:extLst>
+          </p:cNvPr>
+          <p:cNvPicPr>
+            <a:picLocks noChangeAspect="1"/>
+          </p:cNvPicPr>
+          <p:nvPr/>
+        </p:nvPicPr>
+        <p:blipFill rotWithShape="1">
+          <a:blip r:embed="rId2"/>
+          <a:srcRect l="1116" t="4764" r="1319" b="10547"/>
+          <a:stretch/>
+        </p:blipFill>
+        <p:spPr>
+          <a:xfrm>
+            <a:off x="4963092" y="1783005"/>
+            <a:ext cx="3441292" cy="2345635"/>
+          </a:xfrm>
+          <a:prstGeom prst="rect">
+            <a:avLst/>
+          </a:prstGeom>
+        </p:spPr>
+      </p:pic>
+    </p:spTree>
+    <p:extLst>
+      <p:ext uri="{BB962C8B-B14F-4D97-AF65-F5344CB8AC3E}">
+        <p14:creationId xmlns:p14="http://schemas.microsoft.com/office/powerpoint/2010/main" val="2643503708"/>
+      </p:ext>
+    </p:extLst>
+  </p:cSld>
+  <p:clrMapOvr>
+    <a:masterClrMapping/>
+  </p:clrMapOvr>
+</p:sld>
+</file>
+
+<file path=ppt/slides/slide30.xml><?xml version="1.0" encoding="utf-8"?>
 <p:sld xmlns:a="http://schemas.openxmlformats.org/drawingml/2006/main" xmlns:r="http://schemas.openxmlformats.org/officeDocument/2006/relationships" xmlns:p="http://schemas.openxmlformats.org/presentationml/2006/main">
   <p:cSld>
     <p:spTree>
@@ -17265,193 +17686,13 @@
             </a:pPr>
             <a:fld id="{00000000-1234-1234-1234-123412341234}" type="slidenum">
               <a:rPr lang="en"/>
-              <a:t>29</a:t>
+              <a:t>30</a:t>
             </a:fld>
             <a:endParaRPr/>
           </a:p>
         </p:txBody>
       </p:sp>
     </p:spTree>
-  </p:cSld>
-  <p:clrMapOvr>
-    <a:masterClrMapping/>
-  </p:clrMapOvr>
-</p:sld>
-</file>
-
-<file path=ppt/slides/slide3.xml><?xml version="1.0" encoding="utf-8"?>
-<p:sld xmlns:a="http://schemas.openxmlformats.org/drawingml/2006/main" xmlns:r="http://schemas.openxmlformats.org/officeDocument/2006/relationships" xmlns:p="http://schemas.openxmlformats.org/presentationml/2006/main">
-  <p:cSld>
-    <p:spTree>
-      <p:nvGrpSpPr>
-        <p:cNvPr id="1" name=""/>
-        <p:cNvGrpSpPr/>
-        <p:nvPr/>
-      </p:nvGrpSpPr>
-      <p:grpSpPr>
-        <a:xfrm>
-          <a:off x="0" y="0"/>
-          <a:ext cx="0" cy="0"/>
-          <a:chOff x="0" y="0"/>
-          <a:chExt cx="0" cy="0"/>
-        </a:xfrm>
-      </p:grpSpPr>
-      <p:sp>
-        <p:nvSpPr>
-          <p:cNvPr id="2" name="Title 1">
-            <a:extLst>
-              <a:ext uri="{FF2B5EF4-FFF2-40B4-BE49-F238E27FC236}">
-                <a16:creationId xmlns:a16="http://schemas.microsoft.com/office/drawing/2014/main" id="{024AD384-5AD1-4435-A943-1241B2FACD62}"/>
-              </a:ext>
-            </a:extLst>
-          </p:cNvPr>
-          <p:cNvSpPr>
-            <a:spLocks noGrp="1"/>
-          </p:cNvSpPr>
-          <p:nvPr>
-            <p:ph type="title"/>
-          </p:nvPr>
-        </p:nvSpPr>
-        <p:spPr/>
-        <p:txBody>
-          <a:bodyPr/>
-          <a:lstStyle/>
-          <a:p>
-            <a:r>
-              <a:rPr lang="en-US"/>
-              <a:t>Data Science</a:t>
-            </a:r>
-            <a:endParaRPr lang="fa-IR"/>
-          </a:p>
-        </p:txBody>
-      </p:sp>
-      <p:sp>
-        <p:nvSpPr>
-          <p:cNvPr id="3" name="Text Placeholder 2">
-            <a:extLst>
-              <a:ext uri="{FF2B5EF4-FFF2-40B4-BE49-F238E27FC236}">
-                <a16:creationId xmlns:a16="http://schemas.microsoft.com/office/drawing/2014/main" id="{58BE3078-8B89-4550-B497-93E4DADBD57E}"/>
-              </a:ext>
-            </a:extLst>
-          </p:cNvPr>
-          <p:cNvSpPr>
-            <a:spLocks noGrp="1"/>
-          </p:cNvSpPr>
-          <p:nvPr>
-            <p:ph type="body" idx="1"/>
-          </p:nvPr>
-        </p:nvSpPr>
-        <p:spPr>
-          <a:xfrm>
-            <a:off x="786150" y="1142608"/>
-            <a:ext cx="3785850" cy="3626431"/>
-          </a:xfrm>
-        </p:spPr>
-        <p:txBody>
-          <a:bodyPr/>
-          <a:lstStyle/>
-          <a:p>
-            <a:pPr marL="76200" indent="0" algn="just">
-              <a:buNone/>
-            </a:pPr>
-            <a:r>
-              <a:rPr lang="en-US" sz="1400"/>
-              <a:t>A Data Scientist helps companies with data-driven decisions, to make their business better.</a:t>
-            </a:r>
-          </a:p>
-          <a:p>
-            <a:pPr marL="76200" indent="0" algn="just">
-              <a:buNone/>
-            </a:pPr>
-            <a:r>
-              <a:rPr lang="en-US" sz="1400"/>
-              <a:t>Data Science is a combination of multiple disciplines that uses statistics, data analysis, and machine learning to analyze data and to extract knowledge and insights from it.</a:t>
-            </a:r>
-          </a:p>
-          <a:p>
-            <a:pPr marL="76200" indent="0" algn="just">
-              <a:buNone/>
-            </a:pPr>
-            <a:r>
-              <a:rPr lang="en-US" sz="1400"/>
-              <a:t>Data Science is about data gathering, finding patterns in data, data analysis, make future predictions and decision-making.</a:t>
-            </a:r>
-          </a:p>
-        </p:txBody>
-      </p:sp>
-      <p:sp>
-        <p:nvSpPr>
-          <p:cNvPr id="4" name="Slide Number Placeholder 3">
-            <a:extLst>
-              <a:ext uri="{FF2B5EF4-FFF2-40B4-BE49-F238E27FC236}">
-                <a16:creationId xmlns:a16="http://schemas.microsoft.com/office/drawing/2014/main" id="{64987AE6-EC0E-43DD-9376-95A5602EE5E1}"/>
-              </a:ext>
-            </a:extLst>
-          </p:cNvPr>
-          <p:cNvSpPr>
-            <a:spLocks noGrp="1"/>
-          </p:cNvSpPr>
-          <p:nvPr>
-            <p:ph type="sldNum" idx="12"/>
-          </p:nvPr>
-        </p:nvSpPr>
-        <p:spPr/>
-        <p:txBody>
-          <a:bodyPr/>
-          <a:lstStyle/>
-          <a:p>
-            <a:pPr marL="0" lvl="0" indent="0" algn="r" rtl="0">
-              <a:spcBef>
-                <a:spcPts val="0"/>
-              </a:spcBef>
-              <a:spcAft>
-                <a:spcPts val="0"/>
-              </a:spcAft>
-              <a:buNone/>
-            </a:pPr>
-            <a:fld id="{00000000-1234-1234-1234-123412341234}" type="slidenum">
-              <a:rPr lang="en" smtClean="0"/>
-              <a:t>3</a:t>
-            </a:fld>
-            <a:endParaRPr lang="en"/>
-          </a:p>
-        </p:txBody>
-      </p:sp>
-      <p:pic>
-        <p:nvPicPr>
-          <p:cNvPr id="6" name="Picture 5">
-            <a:extLst>
-              <a:ext uri="{FF2B5EF4-FFF2-40B4-BE49-F238E27FC236}">
-                <a16:creationId xmlns:a16="http://schemas.microsoft.com/office/drawing/2014/main" id="{6D0C871E-937D-487A-B5C4-609476DCC06C}"/>
-              </a:ext>
-            </a:extLst>
-          </p:cNvPr>
-          <p:cNvPicPr>
-            <a:picLocks noChangeAspect="1"/>
-          </p:cNvPicPr>
-          <p:nvPr/>
-        </p:nvPicPr>
-        <p:blipFill rotWithShape="1">
-          <a:blip r:embed="rId2"/>
-          <a:srcRect l="1116" t="4764" r="1319" b="10547"/>
-          <a:stretch/>
-        </p:blipFill>
-        <p:spPr>
-          <a:xfrm>
-            <a:off x="4963092" y="1783005"/>
-            <a:ext cx="3441292" cy="2345635"/>
-          </a:xfrm>
-          <a:prstGeom prst="rect">
-            <a:avLst/>
-          </a:prstGeom>
-        </p:spPr>
-      </p:pic>
-    </p:spTree>
-    <p:extLst>
-      <p:ext uri="{BB962C8B-B14F-4D97-AF65-F5344CB8AC3E}">
-        <p14:creationId xmlns:p14="http://schemas.microsoft.com/office/powerpoint/2010/main" val="2643503708"/>
-      </p:ext>
-    </p:extLst>
   </p:cSld>
   <p:clrMapOvr>
     <a:masterClrMapping/>

</xml_diff>